<commit_message>
Changed code for MVA points!
</commit_message>
<xml_diff>
--- a/Presentations for Visual Studio Code MVA/01.Intro-to-node.pptx
+++ b/Presentations for Visual Studio Code MVA/01.Intro-to-node.pptx
@@ -281,7 +281,7 @@
           <a:p>
             <a:fld id="{312E7B4A-039C-48A2-9B2C-AF16AA3873D8}" type="datetimeFigureOut">
               <a:rPr lang="en-US" smtClean="0"/>
-              <a:t>7/28/2015</a:t>
+              <a:t>7/29/2015</a:t>
             </a:fld>
             <a:endParaRPr lang="en-US"/>
           </a:p>
@@ -446,7 +446,7 @@
           <a:p>
             <a:fld id="{DA005A0C-54D9-45AA-87D4-C551D08DFCE1}" type="datetimeFigureOut">
               <a:rPr lang="en-US" smtClean="0"/>
-              <a:t>7/28/2015</a:t>
+              <a:t>7/29/2015</a:t>
             </a:fld>
             <a:endParaRPr lang="en-US"/>
           </a:p>
@@ -5706,15 +5706,7 @@
           <a:p>
             <a:r>
               <a:rPr lang="en-US" dirty="0" smtClean="0"/>
-              <a:t>Easiest is to install via the terminal using the </a:t>
-            </a:r>
-            <a:r>
-              <a:rPr lang="en-US" dirty="0" smtClean="0"/>
-              <a:t>package </a:t>
-            </a:r>
-            <a:r>
-              <a:rPr lang="en-US" dirty="0" smtClean="0"/>
-              <a:t>manager. </a:t>
+              <a:t>Easiest is to install via the terminal using the package manager. </a:t>
             </a:r>
           </a:p>
           <a:p>
@@ -5722,7 +5714,6 @@
               <a:rPr lang="en-US" dirty="0" smtClean="0"/>
               <a:t>You also want to install compilers and build essential tools for packages that might need them. </a:t>
             </a:r>
-            <a:endParaRPr lang="en-US" dirty="0" smtClean="0"/>
           </a:p>
           <a:p>
             <a:endParaRPr lang="en-US" dirty="0" smtClean="0"/>
@@ -5743,14 +5734,7 @@
                 <a:latin typeface="Courier New" panose="02070309020205020404" pitchFamily="49" charset="0"/>
                 <a:cs typeface="Courier New" panose="02070309020205020404" pitchFamily="49" charset="0"/>
               </a:rPr>
-              <a:t> </a:t>
-            </a:r>
-            <a:r>
-              <a:rPr lang="en-US" dirty="0" smtClean="0">
-                <a:latin typeface="Courier New" panose="02070309020205020404" pitchFamily="49" charset="0"/>
-                <a:cs typeface="Courier New" panose="02070309020205020404" pitchFamily="49" charset="0"/>
-              </a:rPr>
-              <a:t>apt-get install build-essential</a:t>
+              <a:t> apt-get install build-essential</a:t>
             </a:r>
           </a:p>
           <a:p>
@@ -5859,11 +5843,7 @@
           <a:p>
             <a:r>
               <a:rPr lang="en-US" dirty="0" smtClean="0"/>
-              <a:t>Meet Stacey </a:t>
-            </a:r>
-            <a:r>
-              <a:rPr lang="en-US" dirty="0" smtClean="0"/>
-              <a:t>Mulcahy</a:t>
+              <a:t>Meet Stacey Mulcahy</a:t>
             </a:r>
             <a:endParaRPr lang="en-US" dirty="0"/>
           </a:p>
@@ -6027,11 +6007,7 @@
           <a:p>
             <a:r>
               <a:rPr lang="en-US" dirty="0" smtClean="0"/>
-              <a:t>Installing Node on </a:t>
-            </a:r>
-            <a:r>
-              <a:rPr lang="en-US" dirty="0" smtClean="0"/>
-              <a:t>OSX</a:t>
+              <a:t>Installing Node on OSX</a:t>
             </a:r>
             <a:endParaRPr lang="en-US" dirty="0"/>
           </a:p>
@@ -6062,11 +6038,7 @@
             </a:r>
             <a:r>
               <a:rPr lang="en-US" dirty="0" smtClean="0"/>
-              <a:t>package </a:t>
-            </a:r>
-            <a:r>
-              <a:rPr lang="en-US" dirty="0" smtClean="0"/>
-              <a:t>manager. </a:t>
+              <a:t>package manager. </a:t>
             </a:r>
           </a:p>
           <a:p>
@@ -6094,19 +6066,8 @@
                 <a:latin typeface="Courier New" panose="02070309020205020404" pitchFamily="49" charset="0"/>
                 <a:cs typeface="Courier New" panose="02070309020205020404" pitchFamily="49" charset="0"/>
               </a:rPr>
-              <a:t> </a:t>
-            </a:r>
-            <a:r>
-              <a:rPr lang="en-US" dirty="0" smtClean="0">
-                <a:latin typeface="Courier New" panose="02070309020205020404" pitchFamily="49" charset="0"/>
-                <a:cs typeface="Courier New" panose="02070309020205020404" pitchFamily="49" charset="0"/>
-              </a:rPr>
-              <a:t>brew install node</a:t>
-            </a:r>
-            <a:endParaRPr lang="en-US" dirty="0" smtClean="0">
-              <a:latin typeface="Courier New" panose="02070309020205020404" pitchFamily="49" charset="0"/>
-              <a:cs typeface="Courier New" panose="02070309020205020404" pitchFamily="49" charset="0"/>
-            </a:endParaRPr>
+              <a:t> brew install node</a:t>
+            </a:r>
           </a:p>
           <a:p>
             <a:endParaRPr lang="en-US" dirty="0" smtClean="0"/>
@@ -7361,11 +7322,11 @@
   <p:clrMapOvr>
     <a:masterClrMapping/>
   </p:clrMapOvr>
-  <mc:AlternateContent xmlns:mc="http://schemas.openxmlformats.org/markup-compatibility/2006">
-    <mc:Choice xmlns:p14="http://schemas.microsoft.com/office/powerpoint/2010/main" Requires="p14">
+  <mc:AlternateContent xmlns:mc="http://schemas.openxmlformats.org/markup-compatibility/2006" xmlns:p14="http://schemas.microsoft.com/office/powerpoint/2010/main">
+    <mc:Choice Requires="p14">
       <p:transition spd="slow" p14:dur="2000"/>
     </mc:Choice>
-    <mc:Fallback>
+    <mc:Fallback xmlns="">
       <p:transition spd="slow"/>
     </mc:Fallback>
   </mc:AlternateContent>
@@ -7639,11 +7600,11 @@
   <p:clrMapOvr>
     <a:masterClrMapping/>
   </p:clrMapOvr>
-  <mc:AlternateContent xmlns:mc="http://schemas.openxmlformats.org/markup-compatibility/2006">
-    <mc:Choice xmlns:p14="http://schemas.microsoft.com/office/powerpoint/2010/main" Requires="p14">
+  <mc:AlternateContent xmlns:mc="http://schemas.openxmlformats.org/markup-compatibility/2006" xmlns:p14="http://schemas.microsoft.com/office/powerpoint/2010/main">
+    <mc:Choice Requires="p14">
       <p:transition spd="slow" p14:dur="2000"/>
     </mc:Choice>
-    <mc:Fallback>
+    <mc:Fallback xmlns="">
       <p:transition spd="slow"/>
     </mc:Fallback>
   </mc:AlternateContent>
@@ -8757,11 +8718,11 @@
   <p:clrMapOvr>
     <a:masterClrMapping/>
   </p:clrMapOvr>
-  <mc:AlternateContent xmlns:mc="http://schemas.openxmlformats.org/markup-compatibility/2006">
-    <mc:Choice xmlns:p14="http://schemas.microsoft.com/office/powerpoint/2010/main" Requires="p14">
+  <mc:AlternateContent xmlns:mc="http://schemas.openxmlformats.org/markup-compatibility/2006" xmlns:p14="http://schemas.microsoft.com/office/powerpoint/2010/main">
+    <mc:Choice Requires="p14">
       <p:transition spd="slow" p14:dur="2000"/>
     </mc:Choice>
-    <mc:Fallback>
+    <mc:Fallback xmlns="">
       <p:transition spd="slow"/>
     </mc:Fallback>
   </mc:AlternateContent>
@@ -10016,7 +9977,6 @@
               <a:rPr lang="en-US" dirty="0"/>
               <a:t>Can specify dev or optional dependencies. </a:t>
             </a:r>
-            <a:endParaRPr lang="en-US" dirty="0"/>
           </a:p>
           <a:p>
             <a:endParaRPr lang="en-US" dirty="0" smtClean="0"/>
@@ -10136,14 +10096,14 @@
                 <a:gridCol w="5762625">
                   <a:extLst>
                     <a:ext uri="{9D8B030D-6E8A-4147-A177-3AD203B41FA5}">
-                      <a16:colId xmlns:a16="http://schemas.microsoft.com/office/drawing/2014/main" xmlns="" val="1632794655"/>
+                      <a16:colId xmlns="" xmlns:a16="http://schemas.microsoft.com/office/drawing/2014/main" val="1632794655"/>
                     </a:ext>
                   </a:extLst>
                 </a:gridCol>
                 <a:gridCol w="5762625">
                   <a:extLst>
                     <a:ext uri="{9D8B030D-6E8A-4147-A177-3AD203B41FA5}">
-                      <a16:colId xmlns:a16="http://schemas.microsoft.com/office/drawing/2014/main" xmlns="" val="2011313899"/>
+                      <a16:colId xmlns="" xmlns:a16="http://schemas.microsoft.com/office/drawing/2014/main" val="2011313899"/>
                     </a:ext>
                   </a:extLst>
                 </a:gridCol>
@@ -10178,7 +10138,7 @@
                 </a:tc>
                 <a:extLst>
                   <a:ext uri="{0D108BD9-81ED-4DB2-BD59-A6C34878D82A}">
-                    <a16:rowId xmlns:a16="http://schemas.microsoft.com/office/drawing/2014/main" xmlns="" val="1789177411"/>
+                    <a16:rowId xmlns="" xmlns:a16="http://schemas.microsoft.com/office/drawing/2014/main" val="1789177411"/>
                   </a:ext>
                 </a:extLst>
               </a:tr>
@@ -10245,7 +10205,7 @@
                 </a:tc>
                 <a:extLst>
                   <a:ext uri="{0D108BD9-81ED-4DB2-BD59-A6C34878D82A}">
-                    <a16:rowId xmlns:a16="http://schemas.microsoft.com/office/drawing/2014/main" xmlns="" val="3842815335"/>
+                    <a16:rowId xmlns="" xmlns:a16="http://schemas.microsoft.com/office/drawing/2014/main" val="3842815335"/>
                   </a:ext>
                 </a:extLst>
               </a:tr>
@@ -10323,7 +10283,7 @@
                 </a:tc>
                 <a:extLst>
                   <a:ext uri="{0D108BD9-81ED-4DB2-BD59-A6C34878D82A}">
-                    <a16:rowId xmlns:a16="http://schemas.microsoft.com/office/drawing/2014/main" xmlns="" val="321066646"/>
+                    <a16:rowId xmlns="" xmlns:a16="http://schemas.microsoft.com/office/drawing/2014/main" val="321066646"/>
                   </a:ext>
                 </a:extLst>
               </a:tr>
@@ -10407,7 +10367,7 @@
                 </a:tc>
                 <a:extLst>
                   <a:ext uri="{0D108BD9-81ED-4DB2-BD59-A6C34878D82A}">
-                    <a16:rowId xmlns:a16="http://schemas.microsoft.com/office/drawing/2014/main" xmlns="" val="3812060533"/>
+                    <a16:rowId xmlns="" xmlns:a16="http://schemas.microsoft.com/office/drawing/2014/main" val="3812060533"/>
                   </a:ext>
                 </a:extLst>
               </a:tr>
@@ -12921,19 +12881,23 @@
             </a:r>
             <a:r>
               <a:rPr lang="en-US" dirty="0" err="1" smtClean="0"/>
-              <a:t>BldAppsnodejs</a:t>
-            </a:r>
-            <a:r>
-              <a:rPr lang="en-US" dirty="0" smtClean="0"/>
-              <a:t> (Expires </a:t>
-            </a:r>
-            <a:r>
-              <a:rPr lang="en-US" dirty="0"/>
-              <a:t>11/14/2014</a:t>
-            </a:r>
-            <a:r>
-              <a:rPr lang="en-US" dirty="0" smtClean="0"/>
-              <a:t>)</a:t>
+              <a:t>NodeJSVisualStudio</a:t>
+            </a:r>
+            <a:r>
+              <a:rPr lang="en-US" dirty="0" smtClean="0"/>
+              <a:t> </a:t>
+            </a:r>
+            <a:r>
+              <a:rPr lang="en-US" dirty="0" smtClean="0"/>
+              <a:t>(</a:t>
+            </a:r>
+            <a:r>
+              <a:rPr lang="en-US" smtClean="0"/>
+              <a:t>Expires </a:t>
+            </a:r>
+            <a:r>
+              <a:rPr lang="en-US" smtClean="0"/>
+              <a:t>08/30/2015)</a:t>
             </a:r>
             <a:endParaRPr lang="en-US" dirty="0"/>
           </a:p>
@@ -14132,15 +14096,6 @@
 </file>
 
 <file path=customXml/item1.xml><?xml version="1.0" encoding="utf-8"?>
-<?mso-contentType ?>
-<FormTemplates xmlns="http://schemas.microsoft.com/sharepoint/v3/contenttype/forms">
-  <Display>DocumentLibraryForm</Display>
-  <Edit>DocumentLibraryForm</Edit>
-  <New>DocumentLibraryForm</New>
-</FormTemplates>
-</file>
-
-<file path=customXml/item2.xml><?xml version="1.0" encoding="utf-8"?>
 <p:properties xmlns:p="http://schemas.microsoft.com/office/2006/metadata/properties" xmlns:xsi="http://www.w3.org/2001/XMLSchema-instance" xmlns:pc="http://schemas.microsoft.com/office/infopath/2007/PartnerControls">
   <documentManagement>
     <SharedWithUsers xmlns="636b0322-90fb-440c-9cbc-22749e7231e9">
@@ -14154,7 +14109,7 @@
 </p:properties>
 </file>
 
-<file path=customXml/item3.xml><?xml version="1.0" encoding="utf-8"?>
+<file path=customXml/item2.xml><?xml version="1.0" encoding="utf-8"?>
 <ct:contentTypeSchema xmlns:ct="http://schemas.microsoft.com/office/2006/metadata/contentType" xmlns:ma="http://schemas.microsoft.com/office/2006/metadata/properties/metaAttributes" ct:_="" ma:_="" ma:contentTypeName="Document" ma:contentTypeID="0x010100391E57C78B9F604FB8BAD296D1460E2A" ma:contentTypeVersion="1" ma:contentTypeDescription="Create a new document." ma:contentTypeScope="" ma:versionID="fb382fe2362acd2155f454904f478e4d">
   <xsd:schema xmlns:xsd="http://www.w3.org/2001/XMLSchema" xmlns:xs="http://www.w3.org/2001/XMLSchema" xmlns:p="http://schemas.microsoft.com/office/2006/metadata/properties" xmlns:ns3="636b0322-90fb-440c-9cbc-22749e7231e9" targetNamespace="http://schemas.microsoft.com/office/2006/metadata/properties" ma:root="true" ma:fieldsID="b9887c63ce4710c1aeb75a5f03aecb69" ns3:_="">
     <xsd:import namespace="636b0322-90fb-440c-9cbc-22749e7231e9"/>
@@ -14294,15 +14249,16 @@
 </ct:contentTypeSchema>
 </file>
 
-<file path=customXml/itemProps1.xml><?xml version="1.0" encoding="utf-8"?>
-<ds:datastoreItem xmlns:ds="http://schemas.openxmlformats.org/officeDocument/2006/customXml" ds:itemID="{B0CA13EC-1D3C-4D6F-8D1C-E8A452CFC79A}">
-  <ds:schemaRefs>
-    <ds:schemaRef ds:uri="http://schemas.microsoft.com/sharepoint/v3/contenttype/forms"/>
-  </ds:schemaRefs>
-</ds:datastoreItem>
+<file path=customXml/item3.xml><?xml version="1.0" encoding="utf-8"?>
+<?mso-contentType ?>
+<FormTemplates xmlns="http://schemas.microsoft.com/sharepoint/v3/contenttype/forms">
+  <Display>DocumentLibraryForm</Display>
+  <Edit>DocumentLibraryForm</Edit>
+  <New>DocumentLibraryForm</New>
+</FormTemplates>
 </file>
 
-<file path=customXml/itemProps2.xml><?xml version="1.0" encoding="utf-8"?>
+<file path=customXml/itemProps1.xml><?xml version="1.0" encoding="utf-8"?>
 <ds:datastoreItem xmlns:ds="http://schemas.openxmlformats.org/officeDocument/2006/customXml" ds:itemID="{7025FDD9-4C58-4084-9F89-0E6ADD6FFF55}">
   <ds:schemaRefs>
     <ds:schemaRef ds:uri="http://purl.org/dc/dcmitype/"/>
@@ -14318,7 +14274,7 @@
 </ds:datastoreItem>
 </file>
 
-<file path=customXml/itemProps3.xml><?xml version="1.0" encoding="utf-8"?>
+<file path=customXml/itemProps2.xml><?xml version="1.0" encoding="utf-8"?>
 <ds:datastoreItem xmlns:ds="http://schemas.openxmlformats.org/officeDocument/2006/customXml" ds:itemID="{7B70CE0C-0988-423A-BF66-B40F6A1061FF}">
   <ds:schemaRefs>
     <ds:schemaRef ds:uri="http://schemas.microsoft.com/office/2006/metadata/contentType"/>
@@ -14334,4 +14290,12 @@
     <ds:schemaRef ds:uri="http://schemas.microsoft.com/internal/obd"/>
   </ds:schemaRefs>
 </ds:datastoreItem>
+</file>
+
+<file path=customXml/itemProps3.xml><?xml version="1.0" encoding="utf-8"?>
+<ds:datastoreItem xmlns:ds="http://schemas.openxmlformats.org/officeDocument/2006/customXml" ds:itemID="{B0CA13EC-1D3C-4D6F-8D1C-E8A452CFC79A}">
+  <ds:schemaRefs>
+    <ds:schemaRef ds:uri="http://schemas.microsoft.com/sharepoint/v3/contenttype/forms"/>
+  </ds:schemaRefs>
+</ds:datastoreItem>
 </file>
</xml_diff>